<commit_message>
Added references and finished initial draft of pptx
</commit_message>
<xml_diff>
--- a/ACE - Sasha Toscano.pptx
+++ b/ACE - Sasha Toscano.pptx
@@ -106,6 +106,11 @@
       </a:defRPr>
     </a:lvl9pPr>
   </p:defaultTextStyle>
+  <p:extLst>
+    <p:ext uri="{EFAFB233-063F-42B5-8137-9DF3F51BA10A}">
+      <p15:sldGuideLst xmlns:p15="http://schemas.microsoft.com/office/powerpoint/2012/main"/>
+    </p:ext>
+  </p:extLst>
 </p:presentation>
 </file>
 
@@ -258,7 +263,7 @@
           <a:p>
             <a:fld id="{C495F1F3-8899-4B4B-9F01-FEC3C350F1B8}" type="datetimeFigureOut">
               <a:rPr lang="en-CH" smtClean="0"/>
-              <a:t>20.02.2025</a:t>
+              <a:t>24.02.2025</a:t>
             </a:fld>
             <a:endParaRPr lang="en-CH"/>
           </a:p>
@@ -458,7 +463,7 @@
           <a:p>
             <a:fld id="{C495F1F3-8899-4B4B-9F01-FEC3C350F1B8}" type="datetimeFigureOut">
               <a:rPr lang="en-CH" smtClean="0"/>
-              <a:t>20.02.2025</a:t>
+              <a:t>24.02.2025</a:t>
             </a:fld>
             <a:endParaRPr lang="en-CH"/>
           </a:p>
@@ -668,7 +673,7 @@
           <a:p>
             <a:fld id="{C495F1F3-8899-4B4B-9F01-FEC3C350F1B8}" type="datetimeFigureOut">
               <a:rPr lang="en-CH" smtClean="0"/>
-              <a:t>20.02.2025</a:t>
+              <a:t>24.02.2025</a:t>
             </a:fld>
             <a:endParaRPr lang="en-CH"/>
           </a:p>
@@ -868,7 +873,7 @@
           <a:p>
             <a:fld id="{C495F1F3-8899-4B4B-9F01-FEC3C350F1B8}" type="datetimeFigureOut">
               <a:rPr lang="en-CH" smtClean="0"/>
-              <a:t>20.02.2025</a:t>
+              <a:t>24.02.2025</a:t>
             </a:fld>
             <a:endParaRPr lang="en-CH"/>
           </a:p>
@@ -1144,7 +1149,7 @@
           <a:p>
             <a:fld id="{C495F1F3-8899-4B4B-9F01-FEC3C350F1B8}" type="datetimeFigureOut">
               <a:rPr lang="en-CH" smtClean="0"/>
-              <a:t>20.02.2025</a:t>
+              <a:t>24.02.2025</a:t>
             </a:fld>
             <a:endParaRPr lang="en-CH"/>
           </a:p>
@@ -1412,7 +1417,7 @@
           <a:p>
             <a:fld id="{C495F1F3-8899-4B4B-9F01-FEC3C350F1B8}" type="datetimeFigureOut">
               <a:rPr lang="en-CH" smtClean="0"/>
-              <a:t>20.02.2025</a:t>
+              <a:t>24.02.2025</a:t>
             </a:fld>
             <a:endParaRPr lang="en-CH"/>
           </a:p>
@@ -1827,7 +1832,7 @@
           <a:p>
             <a:fld id="{C495F1F3-8899-4B4B-9F01-FEC3C350F1B8}" type="datetimeFigureOut">
               <a:rPr lang="en-CH" smtClean="0"/>
-              <a:t>20.02.2025</a:t>
+              <a:t>24.02.2025</a:t>
             </a:fld>
             <a:endParaRPr lang="en-CH"/>
           </a:p>
@@ -1969,7 +1974,7 @@
           <a:p>
             <a:fld id="{C495F1F3-8899-4B4B-9F01-FEC3C350F1B8}" type="datetimeFigureOut">
               <a:rPr lang="en-CH" smtClean="0"/>
-              <a:t>20.02.2025</a:t>
+              <a:t>24.02.2025</a:t>
             </a:fld>
             <a:endParaRPr lang="en-CH"/>
           </a:p>
@@ -2082,7 +2087,7 @@
           <a:p>
             <a:fld id="{C495F1F3-8899-4B4B-9F01-FEC3C350F1B8}" type="datetimeFigureOut">
               <a:rPr lang="en-CH" smtClean="0"/>
-              <a:t>20.02.2025</a:t>
+              <a:t>24.02.2025</a:t>
             </a:fld>
             <a:endParaRPr lang="en-CH"/>
           </a:p>
@@ -2395,7 +2400,7 @@
           <a:p>
             <a:fld id="{C495F1F3-8899-4B4B-9F01-FEC3C350F1B8}" type="datetimeFigureOut">
               <a:rPr lang="en-CH" smtClean="0"/>
-              <a:t>20.02.2025</a:t>
+              <a:t>24.02.2025</a:t>
             </a:fld>
             <a:endParaRPr lang="en-CH"/>
           </a:p>
@@ -2684,7 +2689,7 @@
           <a:p>
             <a:fld id="{C495F1F3-8899-4B4B-9F01-FEC3C350F1B8}" type="datetimeFigureOut">
               <a:rPr lang="en-CH" smtClean="0"/>
-              <a:t>20.02.2025</a:t>
+              <a:t>24.02.2025</a:t>
             </a:fld>
             <a:endParaRPr lang="en-CH"/>
           </a:p>
@@ -2927,7 +2932,7 @@
           <a:p>
             <a:fld id="{C495F1F3-8899-4B4B-9F01-FEC3C350F1B8}" type="datetimeFigureOut">
               <a:rPr lang="en-CH" smtClean="0"/>
-              <a:t>20.02.2025</a:t>
+              <a:t>24.02.2025</a:t>
             </a:fld>
             <a:endParaRPr lang="en-CH"/>
           </a:p>
@@ -3360,7 +3365,12 @@
             <p:ph type="ctrTitle"/>
           </p:nvPr>
         </p:nvSpPr>
-        <p:spPr/>
+        <p:spPr>
+          <a:xfrm>
+            <a:off x="1524000" y="1523623"/>
+            <a:ext cx="9144000" cy="2387600"/>
+          </a:xfrm>
+        </p:spPr>
         <p:txBody>
           <a:bodyPr/>
           <a:lstStyle/>
@@ -3389,7 +3399,12 @@
             <p:ph type="subTitle" idx="1"/>
           </p:nvPr>
         </p:nvSpPr>
-        <p:spPr/>
+        <p:spPr>
+          <a:xfrm>
+            <a:off x="1524000" y="3911223"/>
+            <a:ext cx="9144000" cy="1655762"/>
+          </a:xfrm>
+        </p:spPr>
         <p:txBody>
           <a:bodyPr/>
           <a:lstStyle/>
@@ -3415,6 +3430,88 @@
             <a:r>
               <a:rPr lang="en-US" dirty="0" err="1"/>
               <a:t>Furia</a:t>
+            </a:r>
+            <a:endParaRPr lang="en-CH" dirty="0"/>
+          </a:p>
+        </p:txBody>
+      </p:sp>
+      <p:pic>
+        <p:nvPicPr>
+          <p:cNvPr id="5" name="Picture 4" descr="A black background with a black square&#10;&#10;AI-generated content may be incorrect.">
+            <a:extLst>
+              <a:ext uri="{FF2B5EF4-FFF2-40B4-BE49-F238E27FC236}">
+                <a16:creationId xmlns:a16="http://schemas.microsoft.com/office/drawing/2014/main" id="{C85A8AAF-0DDA-1319-3FC4-3AA9F96423BD}"/>
+              </a:ext>
+            </a:extLst>
+          </p:cNvPr>
+          <p:cNvPicPr>
+            <a:picLocks noChangeAspect="1"/>
+          </p:cNvPicPr>
+          <p:nvPr/>
+        </p:nvPicPr>
+        <p:blipFill>
+          <a:blip r:embed="rId2">
+            <a:extLst>
+              <a:ext uri="{28A0092B-C50C-407E-A947-70E740481C1C}">
+                <a14:useLocalDpi xmlns:a14="http://schemas.microsoft.com/office/drawing/2010/main" val="0"/>
+              </a:ext>
+            </a:extLst>
+          </a:blip>
+          <a:stretch>
+            <a:fillRect/>
+          </a:stretch>
+        </p:blipFill>
+        <p:spPr>
+          <a:xfrm>
+            <a:off x="8806318" y="-337982"/>
+            <a:ext cx="3723364" cy="2093084"/>
+          </a:xfrm>
+          <a:prstGeom prst="rect">
+            <a:avLst/>
+          </a:prstGeom>
+        </p:spPr>
+      </p:pic>
+      <p:sp>
+        <p:nvSpPr>
+          <p:cNvPr id="6" name="TextBox 5">
+            <a:extLst>
+              <a:ext uri="{FF2B5EF4-FFF2-40B4-BE49-F238E27FC236}">
+                <a16:creationId xmlns:a16="http://schemas.microsoft.com/office/drawing/2014/main" id="{728DD13E-33E5-C349-B23B-D8E20B17BB69}"/>
+              </a:ext>
+            </a:extLst>
+          </p:cNvPr>
+          <p:cNvSpPr txBox="1"/>
+          <p:nvPr/>
+        </p:nvSpPr>
+        <p:spPr>
+          <a:xfrm>
+            <a:off x="8517726" y="6140073"/>
+            <a:ext cx="3610774" cy="646331"/>
+          </a:xfrm>
+          <a:prstGeom prst="rect">
+            <a:avLst/>
+          </a:prstGeom>
+          <a:noFill/>
+        </p:spPr>
+        <p:txBody>
+          <a:bodyPr wrap="square" rtlCol="0">
+            <a:spAutoFit/>
+          </a:bodyPr>
+          <a:lstStyle/>
+          <a:p>
+            <a:r>
+              <a:rPr lang="en-US" dirty="0" err="1"/>
+              <a:t>Github</a:t>
+            </a:r>
+            <a:r>
+              <a:rPr lang="en-US" dirty="0"/>
+              <a:t> repository:</a:t>
+            </a:r>
+          </a:p>
+          <a:p>
+            <a:r>
+              <a:rPr lang="en-US" dirty="0"/>
+              <a:t>https://github.com/Fireblast9/ACE</a:t>
             </a:r>
             <a:endParaRPr lang="en-CH" dirty="0"/>
           </a:p>
@@ -3471,7 +3568,11 @@
           <a:bodyPr/>
           <a:lstStyle/>
           <a:p>
-            <a:endParaRPr lang="en-CH"/>
+            <a:r>
+              <a:rPr lang="en-US" dirty="0"/>
+              <a:t>Project activities</a:t>
+            </a:r>
+            <a:endParaRPr lang="en-CH" dirty="0"/>
           </a:p>
         </p:txBody>
       </p:sp>
@@ -3496,10 +3597,120 @@
           <a:bodyPr/>
           <a:lstStyle/>
           <a:p>
-            <a:endParaRPr lang="en-CH"/>
-          </a:p>
-        </p:txBody>
-      </p:sp>
+            <a:pPr marL="0" indent="0">
+              <a:buNone/>
+            </a:pPr>
+            <a:r>
+              <a:rPr lang="en-US" dirty="0"/>
+              <a:t>1) Explanation of what Arbitrary Code Execution (ACE) is	</a:t>
+            </a:r>
+          </a:p>
+          <a:p>
+            <a:pPr lvl="2"/>
+            <a:r>
+              <a:rPr lang="en-US" dirty="0"/>
+              <a:t>Definition, Vulnerabilities examples, Possible threats</a:t>
+            </a:r>
+          </a:p>
+          <a:p>
+            <a:pPr marL="0" indent="0">
+              <a:buNone/>
+            </a:pPr>
+            <a:endParaRPr lang="en-US" dirty="0"/>
+          </a:p>
+          <a:p>
+            <a:pPr marL="0" indent="0">
+              <a:buNone/>
+            </a:pPr>
+            <a:r>
+              <a:rPr lang="en-US" dirty="0"/>
+              <a:t>2) Analysis of the case study (</a:t>
+            </a:r>
+            <a:r>
+              <a:rPr lang="en-US" dirty="0" err="1"/>
+              <a:t>Pokemon</a:t>
+            </a:r>
+            <a:r>
+              <a:rPr lang="en-US" dirty="0"/>
+              <a:t> Emerald, 2004)</a:t>
+            </a:r>
+          </a:p>
+          <a:p>
+            <a:pPr lvl="2"/>
+            <a:r>
+              <a:rPr lang="en-US" dirty="0"/>
+              <a:t>“</a:t>
+            </a:r>
+            <a:r>
+              <a:rPr lang="en-US" dirty="0" err="1"/>
+              <a:t>Pomeg</a:t>
+            </a:r>
+            <a:r>
+              <a:rPr lang="en-US" dirty="0"/>
+              <a:t> glitch”, study of the consequences (analysis of decompiled code)</a:t>
+            </a:r>
+          </a:p>
+          <a:p>
+            <a:pPr marL="0" indent="0">
+              <a:buNone/>
+            </a:pPr>
+            <a:endParaRPr lang="en-US" dirty="0"/>
+          </a:p>
+          <a:p>
+            <a:pPr marL="0" indent="0">
+              <a:buNone/>
+            </a:pPr>
+            <a:r>
+              <a:rPr lang="en-US" dirty="0"/>
+              <a:t>3) Discussion about advancements in protections against ACE</a:t>
+            </a:r>
+          </a:p>
+          <a:p>
+            <a:pPr lvl="2"/>
+            <a:r>
+              <a:rPr lang="en-US" dirty="0"/>
+              <a:t>Recent scenarios analysis, current “State of the art” protection against ACE </a:t>
+            </a:r>
+            <a:endParaRPr lang="en-CH" dirty="0"/>
+          </a:p>
+        </p:txBody>
+      </p:sp>
+      <p:pic>
+        <p:nvPicPr>
+          <p:cNvPr id="4" name="Picture 3" descr="A black background with a black square&#10;&#10;AI-generated content may be incorrect.">
+            <a:extLst>
+              <a:ext uri="{FF2B5EF4-FFF2-40B4-BE49-F238E27FC236}">
+                <a16:creationId xmlns:a16="http://schemas.microsoft.com/office/drawing/2014/main" id="{E562B117-442D-D6B2-9812-3B7779DD115C}"/>
+              </a:ext>
+            </a:extLst>
+          </p:cNvPr>
+          <p:cNvPicPr>
+            <a:picLocks noChangeAspect="1"/>
+          </p:cNvPicPr>
+          <p:nvPr/>
+        </p:nvPicPr>
+        <p:blipFill>
+          <a:blip r:embed="rId2">
+            <a:extLst>
+              <a:ext uri="{28A0092B-C50C-407E-A947-70E740481C1C}">
+                <a14:useLocalDpi xmlns:a14="http://schemas.microsoft.com/office/drawing/2010/main" val="0"/>
+              </a:ext>
+            </a:extLst>
+          </a:blip>
+          <a:stretch>
+            <a:fillRect/>
+          </a:stretch>
+        </p:blipFill>
+        <p:spPr>
+          <a:xfrm>
+            <a:off x="8806318" y="-337982"/>
+            <a:ext cx="3723364" cy="2093084"/>
+          </a:xfrm>
+          <a:prstGeom prst="rect">
+            <a:avLst/>
+          </a:prstGeom>
+        </p:spPr>
+      </p:pic>
     </p:spTree>
     <p:extLst>
       <p:ext uri="{BB962C8B-B14F-4D97-AF65-F5344CB8AC3E}">
@@ -3551,7 +3762,11 @@
           <a:bodyPr/>
           <a:lstStyle/>
           <a:p>
-            <a:endParaRPr lang="en-CH"/>
+            <a:r>
+              <a:rPr lang="en-US" dirty="0"/>
+              <a:t>Schedule</a:t>
+            </a:r>
+            <a:endParaRPr lang="en-CH" dirty="0"/>
           </a:p>
         </p:txBody>
       </p:sp>
@@ -3573,13 +3788,120 @@
         </p:nvSpPr>
         <p:spPr/>
         <p:txBody>
-          <a:bodyPr/>
-          <a:lstStyle/>
-          <a:p>
-            <a:endParaRPr lang="en-CH"/>
-          </a:p>
-        </p:txBody>
-      </p:sp>
+          <a:bodyPr>
+            <a:normAutofit lnSpcReduction="10000"/>
+          </a:bodyPr>
+          <a:lstStyle/>
+          <a:p>
+            <a:pPr marL="0" indent="0">
+              <a:buNone/>
+            </a:pPr>
+            <a:r>
+              <a:rPr lang="en-US" sz="2000" dirty="0"/>
+              <a:t>Week 1-2: finish ACE definition (project activity 1) and start analyzing the decompiled code to prepare the case study section (</a:t>
+            </a:r>
+            <a:r>
+              <a:rPr lang="en-US" sz="2000" dirty="0">
+                <a:hlinkClick r:id="rId2"/>
+              </a:rPr>
+              <a:t>https://github.com/pret/pokeemerald</a:t>
+            </a:r>
+            <a:r>
+              <a:rPr lang="en-US" sz="2000" dirty="0"/>
+              <a:t>) + study and learn Assembly</a:t>
+            </a:r>
+          </a:p>
+          <a:p>
+            <a:pPr marL="0" indent="0">
+              <a:buNone/>
+            </a:pPr>
+            <a:endParaRPr lang="en-US" sz="2000" dirty="0"/>
+          </a:p>
+          <a:p>
+            <a:pPr marL="0" indent="0">
+              <a:buNone/>
+            </a:pPr>
+            <a:r>
+              <a:rPr lang="en-US" sz="2000" dirty="0"/>
+              <a:t>Week 3-7:  complete the case study (project activity 2): explain what happens when the “</a:t>
+            </a:r>
+            <a:r>
+              <a:rPr lang="en-US" sz="2000" dirty="0" err="1"/>
+              <a:t>pomeg</a:t>
+            </a:r>
+            <a:r>
+              <a:rPr lang="en-US" sz="2000" dirty="0"/>
+              <a:t> glitch” occurs, understand and show off what exactly happens on a code level, analyze the risks on the market perspective (exploits, dangers, etc.)</a:t>
+            </a:r>
+          </a:p>
+          <a:p>
+            <a:pPr marL="0" indent="0">
+              <a:buNone/>
+            </a:pPr>
+            <a:endParaRPr lang="en-US" sz="2000" dirty="0"/>
+          </a:p>
+          <a:p>
+            <a:pPr marL="0" indent="0">
+              <a:buNone/>
+            </a:pPr>
+            <a:r>
+              <a:rPr lang="en-US" sz="2000" dirty="0"/>
+              <a:t>Week 8-11: examine what is considered a “state of the art” protection against ACE with recent papers and studies,  elaborate on what can,  should and has to be done to prevent ACE and ACE-like attacks</a:t>
+            </a:r>
+          </a:p>
+          <a:p>
+            <a:pPr marL="0" indent="0">
+              <a:buNone/>
+            </a:pPr>
+            <a:endParaRPr lang="en-US" sz="2000" dirty="0"/>
+          </a:p>
+          <a:p>
+            <a:pPr marL="0" indent="0">
+              <a:buNone/>
+            </a:pPr>
+            <a:r>
+              <a:rPr lang="en-US" sz="2000" dirty="0"/>
+              <a:t>Week 11-12: reviews and corrections</a:t>
+            </a:r>
+          </a:p>
+        </p:txBody>
+      </p:sp>
+      <p:pic>
+        <p:nvPicPr>
+          <p:cNvPr id="4" name="Picture 3" descr="A black background with a black square&#10;&#10;AI-generated content may be incorrect.">
+            <a:extLst>
+              <a:ext uri="{FF2B5EF4-FFF2-40B4-BE49-F238E27FC236}">
+                <a16:creationId xmlns:a16="http://schemas.microsoft.com/office/drawing/2014/main" id="{6A954F25-AE33-5BDE-27A8-BF44D305148B}"/>
+              </a:ext>
+            </a:extLst>
+          </p:cNvPr>
+          <p:cNvPicPr>
+            <a:picLocks noChangeAspect="1"/>
+          </p:cNvPicPr>
+          <p:nvPr/>
+        </p:nvPicPr>
+        <p:blipFill>
+          <a:blip r:embed="rId3">
+            <a:extLst>
+              <a:ext uri="{28A0092B-C50C-407E-A947-70E740481C1C}">
+                <a14:useLocalDpi xmlns:a14="http://schemas.microsoft.com/office/drawing/2010/main" val="0"/>
+              </a:ext>
+            </a:extLst>
+          </a:blip>
+          <a:stretch>
+            <a:fillRect/>
+          </a:stretch>
+        </p:blipFill>
+        <p:spPr>
+          <a:xfrm>
+            <a:off x="8806318" y="-337982"/>
+            <a:ext cx="3723364" cy="2093084"/>
+          </a:xfrm>
+          <a:prstGeom prst="rect">
+            <a:avLst/>
+          </a:prstGeom>
+        </p:spPr>
+      </p:pic>
     </p:spTree>
     <p:extLst>
       <p:ext uri="{BB962C8B-B14F-4D97-AF65-F5344CB8AC3E}">

</xml_diff>

<commit_message>
Pushed template + created actual folder
</commit_message>
<xml_diff>
--- a/ACE - Sasha Toscano.pptx
+++ b/ACE - Sasha Toscano.pptx
@@ -263,7 +263,7 @@
           <a:p>
             <a:fld id="{C495F1F3-8899-4B4B-9F01-FEC3C350F1B8}" type="datetimeFigureOut">
               <a:rPr lang="en-CH" smtClean="0"/>
-              <a:t>24.02.2025</a:t>
+              <a:t>25.02.2025</a:t>
             </a:fld>
             <a:endParaRPr lang="en-CH"/>
           </a:p>
@@ -463,7 +463,7 @@
           <a:p>
             <a:fld id="{C495F1F3-8899-4B4B-9F01-FEC3C350F1B8}" type="datetimeFigureOut">
               <a:rPr lang="en-CH" smtClean="0"/>
-              <a:t>24.02.2025</a:t>
+              <a:t>25.02.2025</a:t>
             </a:fld>
             <a:endParaRPr lang="en-CH"/>
           </a:p>
@@ -673,7 +673,7 @@
           <a:p>
             <a:fld id="{C495F1F3-8899-4B4B-9F01-FEC3C350F1B8}" type="datetimeFigureOut">
               <a:rPr lang="en-CH" smtClean="0"/>
-              <a:t>24.02.2025</a:t>
+              <a:t>25.02.2025</a:t>
             </a:fld>
             <a:endParaRPr lang="en-CH"/>
           </a:p>
@@ -873,7 +873,7 @@
           <a:p>
             <a:fld id="{C495F1F3-8899-4B4B-9F01-FEC3C350F1B8}" type="datetimeFigureOut">
               <a:rPr lang="en-CH" smtClean="0"/>
-              <a:t>24.02.2025</a:t>
+              <a:t>25.02.2025</a:t>
             </a:fld>
             <a:endParaRPr lang="en-CH"/>
           </a:p>
@@ -1149,7 +1149,7 @@
           <a:p>
             <a:fld id="{C495F1F3-8899-4B4B-9F01-FEC3C350F1B8}" type="datetimeFigureOut">
               <a:rPr lang="en-CH" smtClean="0"/>
-              <a:t>24.02.2025</a:t>
+              <a:t>25.02.2025</a:t>
             </a:fld>
             <a:endParaRPr lang="en-CH"/>
           </a:p>
@@ -1417,7 +1417,7 @@
           <a:p>
             <a:fld id="{C495F1F3-8899-4B4B-9F01-FEC3C350F1B8}" type="datetimeFigureOut">
               <a:rPr lang="en-CH" smtClean="0"/>
-              <a:t>24.02.2025</a:t>
+              <a:t>25.02.2025</a:t>
             </a:fld>
             <a:endParaRPr lang="en-CH"/>
           </a:p>
@@ -1832,7 +1832,7 @@
           <a:p>
             <a:fld id="{C495F1F3-8899-4B4B-9F01-FEC3C350F1B8}" type="datetimeFigureOut">
               <a:rPr lang="en-CH" smtClean="0"/>
-              <a:t>24.02.2025</a:t>
+              <a:t>25.02.2025</a:t>
             </a:fld>
             <a:endParaRPr lang="en-CH"/>
           </a:p>
@@ -1974,7 +1974,7 @@
           <a:p>
             <a:fld id="{C495F1F3-8899-4B4B-9F01-FEC3C350F1B8}" type="datetimeFigureOut">
               <a:rPr lang="en-CH" smtClean="0"/>
-              <a:t>24.02.2025</a:t>
+              <a:t>25.02.2025</a:t>
             </a:fld>
             <a:endParaRPr lang="en-CH"/>
           </a:p>
@@ -2087,7 +2087,7 @@
           <a:p>
             <a:fld id="{C495F1F3-8899-4B4B-9F01-FEC3C350F1B8}" type="datetimeFigureOut">
               <a:rPr lang="en-CH" smtClean="0"/>
-              <a:t>24.02.2025</a:t>
+              <a:t>25.02.2025</a:t>
             </a:fld>
             <a:endParaRPr lang="en-CH"/>
           </a:p>
@@ -2400,7 +2400,7 @@
           <a:p>
             <a:fld id="{C495F1F3-8899-4B4B-9F01-FEC3C350F1B8}" type="datetimeFigureOut">
               <a:rPr lang="en-CH" smtClean="0"/>
-              <a:t>24.02.2025</a:t>
+              <a:t>25.02.2025</a:t>
             </a:fld>
             <a:endParaRPr lang="en-CH"/>
           </a:p>
@@ -2689,7 +2689,7 @@
           <a:p>
             <a:fld id="{C495F1F3-8899-4B4B-9F01-FEC3C350F1B8}" type="datetimeFigureOut">
               <a:rPr lang="en-CH" smtClean="0"/>
-              <a:t>24.02.2025</a:t>
+              <a:t>25.02.2025</a:t>
             </a:fld>
             <a:endParaRPr lang="en-CH"/>
           </a:p>
@@ -2932,7 +2932,7 @@
           <a:p>
             <a:fld id="{C495F1F3-8899-4B4B-9F01-FEC3C350F1B8}" type="datetimeFigureOut">
               <a:rPr lang="en-CH" smtClean="0"/>
-              <a:t>24.02.2025</a:t>
+              <a:t>25.02.2025</a:t>
             </a:fld>
             <a:endParaRPr lang="en-CH"/>
           </a:p>
@@ -3435,42 +3435,6 @@
           </a:p>
         </p:txBody>
       </p:sp>
-      <p:pic>
-        <p:nvPicPr>
-          <p:cNvPr id="5" name="Picture 4" descr="A black background with a black square&#10;&#10;AI-generated content may be incorrect.">
-            <a:extLst>
-              <a:ext uri="{FF2B5EF4-FFF2-40B4-BE49-F238E27FC236}">
-                <a16:creationId xmlns:a16="http://schemas.microsoft.com/office/drawing/2014/main" id="{C85A8AAF-0DDA-1319-3FC4-3AA9F96423BD}"/>
-              </a:ext>
-            </a:extLst>
-          </p:cNvPr>
-          <p:cNvPicPr>
-            <a:picLocks noChangeAspect="1"/>
-          </p:cNvPicPr>
-          <p:nvPr/>
-        </p:nvPicPr>
-        <p:blipFill>
-          <a:blip r:embed="rId2">
-            <a:extLst>
-              <a:ext uri="{28A0092B-C50C-407E-A947-70E740481C1C}">
-                <a14:useLocalDpi xmlns:a14="http://schemas.microsoft.com/office/drawing/2010/main" val="0"/>
-              </a:ext>
-            </a:extLst>
-          </a:blip>
-          <a:stretch>
-            <a:fillRect/>
-          </a:stretch>
-        </p:blipFill>
-        <p:spPr>
-          <a:xfrm>
-            <a:off x="8806318" y="-337982"/>
-            <a:ext cx="3723364" cy="2093084"/>
-          </a:xfrm>
-          <a:prstGeom prst="rect">
-            <a:avLst/>
-          </a:prstGeom>
-        </p:spPr>
-      </p:pic>
       <p:sp>
         <p:nvSpPr>
           <p:cNvPr id="6" name="TextBox 5">
@@ -3500,23 +3464,55 @@
           <a:lstStyle/>
           <a:p>
             <a:r>
-              <a:rPr lang="en-US" dirty="0" err="1"/>
-              <a:t>Github</a:t>
-            </a:r>
-            <a:r>
               <a:rPr lang="en-US" dirty="0"/>
-              <a:t> repository:</a:t>
-            </a:r>
-          </a:p>
-          <a:p>
+              <a:t>GitHub repository:</a:t>
+            </a:r>
+          </a:p>
+          <a:p>
+            <a:r>
+              <a:rPr lang="en-US" dirty="0">
+                <a:hlinkClick r:id="rId2"/>
+              </a:rPr>
+              <a:t>https://github.com/Fireblast9/ACE</a:t>
+            </a:r>
             <a:r>
               <a:rPr lang="en-US" dirty="0"/>
-              <a:t>https://github.com/Fireblast9/ACE</a:t>
+              <a:t> </a:t>
             </a:r>
             <a:endParaRPr lang="en-CH" dirty="0"/>
           </a:p>
         </p:txBody>
       </p:sp>
+      <p:pic>
+        <p:nvPicPr>
+          <p:cNvPr id="11" name="Picture 10">
+            <a:extLst>
+              <a:ext uri="{FF2B5EF4-FFF2-40B4-BE49-F238E27FC236}">
+                <a16:creationId xmlns:a16="http://schemas.microsoft.com/office/drawing/2014/main" id="{F4810B96-73C2-5B0B-3D9C-4857A8D94B7C}"/>
+              </a:ext>
+            </a:extLst>
+          </p:cNvPr>
+          <p:cNvPicPr>
+            <a:picLocks noChangeAspect="1"/>
+          </p:cNvPicPr>
+          <p:nvPr/>
+        </p:nvPicPr>
+        <p:blipFill>
+          <a:blip r:embed="rId3"/>
+          <a:stretch>
+            <a:fillRect/>
+          </a:stretch>
+        </p:blipFill>
+        <p:spPr>
+          <a:xfrm>
+            <a:off x="8941710" y="133613"/>
+            <a:ext cx="3250289" cy="971561"/>
+          </a:xfrm>
+          <a:prstGeom prst="rect">
+            <a:avLst/>
+          </a:prstGeom>
+        </p:spPr>
+      </p:pic>
     </p:spTree>
     <p:extLst>
       <p:ext uri="{BB962C8B-B14F-4D97-AF65-F5344CB8AC3E}">
@@ -3606,7 +3602,9 @@
             </a:r>
           </a:p>
           <a:p>
-            <a:pPr lvl="2"/>
+            <a:pPr marL="914400" lvl="2" indent="0">
+              <a:buNone/>
+            </a:pPr>
             <a:r>
               <a:rPr lang="en-US" dirty="0"/>
               <a:t>Definition, Vulnerabilities examples, Possible threats</a:t>
@@ -3624,19 +3622,13 @@
             </a:pPr>
             <a:r>
               <a:rPr lang="en-US" dirty="0"/>
-              <a:t>2) Analysis of the case study (</a:t>
-            </a:r>
-            <a:r>
-              <a:rPr lang="en-US" dirty="0" err="1"/>
-              <a:t>Pokemon</a:t>
-            </a:r>
-            <a:r>
-              <a:rPr lang="en-US" dirty="0"/>
-              <a:t> Emerald, 2004)</a:t>
-            </a:r>
-          </a:p>
-          <a:p>
-            <a:pPr lvl="2"/>
+              <a:t>2) Analysis of the case study (Pokémon Emerald, 2004)</a:t>
+            </a:r>
+          </a:p>
+          <a:p>
+            <a:pPr marL="914400" lvl="2" indent="0">
+              <a:buNone/>
+            </a:pPr>
             <a:r>
               <a:rPr lang="en-US" dirty="0"/>
               <a:t>“</a:t>
@@ -3666,7 +3658,9 @@
             </a:r>
           </a:p>
           <a:p>
-            <a:pPr lvl="2"/>
+            <a:pPr marL="914400" lvl="2" indent="0">
+              <a:buNone/>
+            </a:pPr>
             <a:r>
               <a:rPr lang="en-US" dirty="0"/>
               <a:t>Recent scenarios analysis, current “State of the art” protection against ACE </a:t>
@@ -3677,10 +3671,10 @@
       </p:sp>
       <p:pic>
         <p:nvPicPr>
-          <p:cNvPr id="4" name="Picture 3" descr="A black background with a black square&#10;&#10;AI-generated content may be incorrect.">
-            <a:extLst>
-              <a:ext uri="{FF2B5EF4-FFF2-40B4-BE49-F238E27FC236}">
-                <a16:creationId xmlns:a16="http://schemas.microsoft.com/office/drawing/2014/main" id="{E562B117-442D-D6B2-9812-3B7779DD115C}"/>
+          <p:cNvPr id="6" name="Picture 5">
+            <a:extLst>
+              <a:ext uri="{FF2B5EF4-FFF2-40B4-BE49-F238E27FC236}">
+                <a16:creationId xmlns:a16="http://schemas.microsoft.com/office/drawing/2014/main" id="{E7C31706-1CA9-519C-B565-1D576AA4B1E7}"/>
               </a:ext>
             </a:extLst>
           </p:cNvPr>
@@ -3690,21 +3684,15 @@
           <p:nvPr/>
         </p:nvPicPr>
         <p:blipFill>
-          <a:blip r:embed="rId2">
-            <a:extLst>
-              <a:ext uri="{28A0092B-C50C-407E-A947-70E740481C1C}">
-                <a14:useLocalDpi xmlns:a14="http://schemas.microsoft.com/office/drawing/2010/main" val="0"/>
-              </a:ext>
-            </a:extLst>
-          </a:blip>
+          <a:blip r:embed="rId2"/>
           <a:stretch>
             <a:fillRect/>
           </a:stretch>
         </p:blipFill>
         <p:spPr>
           <a:xfrm>
-            <a:off x="8806318" y="-337982"/>
-            <a:ext cx="3723364" cy="2093084"/>
+            <a:off x="8941710" y="133613"/>
+            <a:ext cx="3250289" cy="971561"/>
           </a:xfrm>
           <a:prstGeom prst="rect">
             <a:avLst/>
@@ -3846,7 +3834,7 @@
             </a:pPr>
             <a:r>
               <a:rPr lang="en-US" sz="2000" dirty="0"/>
-              <a:t>Week 8-11: examine what is considered a “state of the art” protection against ACE with recent papers and studies,  elaborate on what can,  should and has to be done to prevent ACE and ACE-like attacks</a:t>
+              <a:t>Week 8-11: examine what is considered a “state of the art” protection against ACE with recent papers and studies, elaborate on what can, should and has to be done to prevent ACE and ACE-like attacks (project activity 3)</a:t>
             </a:r>
           </a:p>
           <a:p>
@@ -3868,10 +3856,10 @@
       </p:sp>
       <p:pic>
         <p:nvPicPr>
-          <p:cNvPr id="4" name="Picture 3" descr="A black background with a black square&#10;&#10;AI-generated content may be incorrect.">
-            <a:extLst>
-              <a:ext uri="{FF2B5EF4-FFF2-40B4-BE49-F238E27FC236}">
-                <a16:creationId xmlns:a16="http://schemas.microsoft.com/office/drawing/2014/main" id="{6A954F25-AE33-5BDE-27A8-BF44D305148B}"/>
+          <p:cNvPr id="5" name="Picture 4">
+            <a:extLst>
+              <a:ext uri="{FF2B5EF4-FFF2-40B4-BE49-F238E27FC236}">
+                <a16:creationId xmlns:a16="http://schemas.microsoft.com/office/drawing/2014/main" id="{96FD9288-9D49-E61D-C161-98A746F41E8D}"/>
               </a:ext>
             </a:extLst>
           </p:cNvPr>
@@ -3881,21 +3869,15 @@
           <p:nvPr/>
         </p:nvPicPr>
         <p:blipFill>
-          <a:blip r:embed="rId3">
-            <a:extLst>
-              <a:ext uri="{28A0092B-C50C-407E-A947-70E740481C1C}">
-                <a14:useLocalDpi xmlns:a14="http://schemas.microsoft.com/office/drawing/2010/main" val="0"/>
-              </a:ext>
-            </a:extLst>
-          </a:blip>
+          <a:blip r:embed="rId3"/>
           <a:stretch>
             <a:fillRect/>
           </a:stretch>
         </p:blipFill>
         <p:spPr>
           <a:xfrm>
-            <a:off x="8806318" y="-337982"/>
-            <a:ext cx="3723364" cy="2093084"/>
+            <a:off x="8941710" y="133613"/>
+            <a:ext cx="3250289" cy="971561"/>
           </a:xfrm>
           <a:prstGeom prst="rect">
             <a:avLst/>

</xml_diff>

<commit_message>
Finished title and summary presentation
</commit_message>
<xml_diff>
--- a/ACE - Sasha Toscano.pptx
+++ b/ACE - Sasha Toscano.pptx
@@ -263,7 +263,7 @@
           <a:p>
             <a:fld id="{C495F1F3-8899-4B4B-9F01-FEC3C350F1B8}" type="datetimeFigureOut">
               <a:rPr lang="en-CH" smtClean="0"/>
-              <a:t>25.02.2025</a:t>
+              <a:t>26.02.2025</a:t>
             </a:fld>
             <a:endParaRPr lang="en-CH"/>
           </a:p>
@@ -463,7 +463,7 @@
           <a:p>
             <a:fld id="{C495F1F3-8899-4B4B-9F01-FEC3C350F1B8}" type="datetimeFigureOut">
               <a:rPr lang="en-CH" smtClean="0"/>
-              <a:t>25.02.2025</a:t>
+              <a:t>26.02.2025</a:t>
             </a:fld>
             <a:endParaRPr lang="en-CH"/>
           </a:p>
@@ -673,7 +673,7 @@
           <a:p>
             <a:fld id="{C495F1F3-8899-4B4B-9F01-FEC3C350F1B8}" type="datetimeFigureOut">
               <a:rPr lang="en-CH" smtClean="0"/>
-              <a:t>25.02.2025</a:t>
+              <a:t>26.02.2025</a:t>
             </a:fld>
             <a:endParaRPr lang="en-CH"/>
           </a:p>
@@ -873,7 +873,7 @@
           <a:p>
             <a:fld id="{C495F1F3-8899-4B4B-9F01-FEC3C350F1B8}" type="datetimeFigureOut">
               <a:rPr lang="en-CH" smtClean="0"/>
-              <a:t>25.02.2025</a:t>
+              <a:t>26.02.2025</a:t>
             </a:fld>
             <a:endParaRPr lang="en-CH"/>
           </a:p>
@@ -1149,7 +1149,7 @@
           <a:p>
             <a:fld id="{C495F1F3-8899-4B4B-9F01-FEC3C350F1B8}" type="datetimeFigureOut">
               <a:rPr lang="en-CH" smtClean="0"/>
-              <a:t>25.02.2025</a:t>
+              <a:t>26.02.2025</a:t>
             </a:fld>
             <a:endParaRPr lang="en-CH"/>
           </a:p>
@@ -1417,7 +1417,7 @@
           <a:p>
             <a:fld id="{C495F1F3-8899-4B4B-9F01-FEC3C350F1B8}" type="datetimeFigureOut">
               <a:rPr lang="en-CH" smtClean="0"/>
-              <a:t>25.02.2025</a:t>
+              <a:t>26.02.2025</a:t>
             </a:fld>
             <a:endParaRPr lang="en-CH"/>
           </a:p>
@@ -1832,7 +1832,7 @@
           <a:p>
             <a:fld id="{C495F1F3-8899-4B4B-9F01-FEC3C350F1B8}" type="datetimeFigureOut">
               <a:rPr lang="en-CH" smtClean="0"/>
-              <a:t>25.02.2025</a:t>
+              <a:t>26.02.2025</a:t>
             </a:fld>
             <a:endParaRPr lang="en-CH"/>
           </a:p>
@@ -1974,7 +1974,7 @@
           <a:p>
             <a:fld id="{C495F1F3-8899-4B4B-9F01-FEC3C350F1B8}" type="datetimeFigureOut">
               <a:rPr lang="en-CH" smtClean="0"/>
-              <a:t>25.02.2025</a:t>
+              <a:t>26.02.2025</a:t>
             </a:fld>
             <a:endParaRPr lang="en-CH"/>
           </a:p>
@@ -2087,7 +2087,7 @@
           <a:p>
             <a:fld id="{C495F1F3-8899-4B4B-9F01-FEC3C350F1B8}" type="datetimeFigureOut">
               <a:rPr lang="en-CH" smtClean="0"/>
-              <a:t>25.02.2025</a:t>
+              <a:t>26.02.2025</a:t>
             </a:fld>
             <a:endParaRPr lang="en-CH"/>
           </a:p>
@@ -2400,7 +2400,7 @@
           <a:p>
             <a:fld id="{C495F1F3-8899-4B4B-9F01-FEC3C350F1B8}" type="datetimeFigureOut">
               <a:rPr lang="en-CH" smtClean="0"/>
-              <a:t>25.02.2025</a:t>
+              <a:t>26.02.2025</a:t>
             </a:fld>
             <a:endParaRPr lang="en-CH"/>
           </a:p>
@@ -2689,7 +2689,7 @@
           <a:p>
             <a:fld id="{C495F1F3-8899-4B4B-9F01-FEC3C350F1B8}" type="datetimeFigureOut">
               <a:rPr lang="en-CH" smtClean="0"/>
-              <a:t>25.02.2025</a:t>
+              <a:t>26.02.2025</a:t>
             </a:fld>
             <a:endParaRPr lang="en-CH"/>
           </a:p>
@@ -2932,7 +2932,7 @@
           <a:p>
             <a:fld id="{C495F1F3-8899-4B4B-9F01-FEC3C350F1B8}" type="datetimeFigureOut">
               <a:rPr lang="en-CH" smtClean="0"/>
-              <a:t>25.02.2025</a:t>
+              <a:t>26.02.2025</a:t>
             </a:fld>
             <a:endParaRPr lang="en-CH"/>
           </a:p>
@@ -3401,7 +3401,7 @@
         </p:nvSpPr>
         <p:spPr>
           <a:xfrm>
-            <a:off x="1524000" y="3911223"/>
+            <a:off x="1422854" y="4431923"/>
             <a:ext cx="9144000" cy="1655762"/>
           </a:xfrm>
         </p:spPr>
@@ -3410,28 +3410,28 @@
           <a:lstStyle/>
           <a:p>
             <a:r>
-              <a:rPr lang="en-US" dirty="0"/>
+              <a:rPr lang="en-US" sz="4000" dirty="0"/>
               <a:t>Author: Sasha Toscano</a:t>
             </a:r>
           </a:p>
           <a:p>
             <a:r>
-              <a:rPr lang="en-US" dirty="0"/>
+              <a:rPr lang="en-US" i="1" dirty="0"/>
               <a:t>Advisors: Marc </a:t>
             </a:r>
             <a:r>
-              <a:rPr lang="en-US" dirty="0" err="1"/>
+              <a:rPr lang="en-US" i="1" dirty="0" err="1"/>
               <a:t>Langheinrich</a:t>
             </a:r>
             <a:r>
-              <a:rPr lang="en-US" dirty="0"/>
+              <a:rPr lang="en-US" i="1" dirty="0"/>
               <a:t>, Carlo Alberto </a:t>
             </a:r>
             <a:r>
-              <a:rPr lang="en-US" dirty="0" err="1"/>
+              <a:rPr lang="en-US" i="1" dirty="0" err="1"/>
               <a:t>Furia</a:t>
             </a:r>
-            <a:endParaRPr lang="en-CH" dirty="0"/>
+            <a:endParaRPr lang="en-CH" i="1" dirty="0"/>
           </a:p>
         </p:txBody>
       </p:sp>

</xml_diff>

<commit_message>
Update presentation and pdf
</commit_message>
<xml_diff>
--- a/ACE - Sasha Toscano.pptx
+++ b/ACE - Sasha Toscano.pptx
@@ -263,7 +263,7 @@
           <a:p>
             <a:fld id="{C495F1F3-8899-4B4B-9F01-FEC3C350F1B8}" type="datetimeFigureOut">
               <a:rPr lang="en-CH" smtClean="0"/>
-              <a:t>26.02.2025</a:t>
+              <a:t>28.02.2025</a:t>
             </a:fld>
             <a:endParaRPr lang="en-CH"/>
           </a:p>
@@ -463,7 +463,7 @@
           <a:p>
             <a:fld id="{C495F1F3-8899-4B4B-9F01-FEC3C350F1B8}" type="datetimeFigureOut">
               <a:rPr lang="en-CH" smtClean="0"/>
-              <a:t>26.02.2025</a:t>
+              <a:t>28.02.2025</a:t>
             </a:fld>
             <a:endParaRPr lang="en-CH"/>
           </a:p>
@@ -673,7 +673,7 @@
           <a:p>
             <a:fld id="{C495F1F3-8899-4B4B-9F01-FEC3C350F1B8}" type="datetimeFigureOut">
               <a:rPr lang="en-CH" smtClean="0"/>
-              <a:t>26.02.2025</a:t>
+              <a:t>28.02.2025</a:t>
             </a:fld>
             <a:endParaRPr lang="en-CH"/>
           </a:p>
@@ -873,7 +873,7 @@
           <a:p>
             <a:fld id="{C495F1F3-8899-4B4B-9F01-FEC3C350F1B8}" type="datetimeFigureOut">
               <a:rPr lang="en-CH" smtClean="0"/>
-              <a:t>26.02.2025</a:t>
+              <a:t>28.02.2025</a:t>
             </a:fld>
             <a:endParaRPr lang="en-CH"/>
           </a:p>
@@ -1149,7 +1149,7 @@
           <a:p>
             <a:fld id="{C495F1F3-8899-4B4B-9F01-FEC3C350F1B8}" type="datetimeFigureOut">
               <a:rPr lang="en-CH" smtClean="0"/>
-              <a:t>26.02.2025</a:t>
+              <a:t>28.02.2025</a:t>
             </a:fld>
             <a:endParaRPr lang="en-CH"/>
           </a:p>
@@ -1417,7 +1417,7 @@
           <a:p>
             <a:fld id="{C495F1F3-8899-4B4B-9F01-FEC3C350F1B8}" type="datetimeFigureOut">
               <a:rPr lang="en-CH" smtClean="0"/>
-              <a:t>26.02.2025</a:t>
+              <a:t>28.02.2025</a:t>
             </a:fld>
             <a:endParaRPr lang="en-CH"/>
           </a:p>
@@ -1832,7 +1832,7 @@
           <a:p>
             <a:fld id="{C495F1F3-8899-4B4B-9F01-FEC3C350F1B8}" type="datetimeFigureOut">
               <a:rPr lang="en-CH" smtClean="0"/>
-              <a:t>26.02.2025</a:t>
+              <a:t>28.02.2025</a:t>
             </a:fld>
             <a:endParaRPr lang="en-CH"/>
           </a:p>
@@ -1974,7 +1974,7 @@
           <a:p>
             <a:fld id="{C495F1F3-8899-4B4B-9F01-FEC3C350F1B8}" type="datetimeFigureOut">
               <a:rPr lang="en-CH" smtClean="0"/>
-              <a:t>26.02.2025</a:t>
+              <a:t>28.02.2025</a:t>
             </a:fld>
             <a:endParaRPr lang="en-CH"/>
           </a:p>
@@ -2087,7 +2087,7 @@
           <a:p>
             <a:fld id="{C495F1F3-8899-4B4B-9F01-FEC3C350F1B8}" type="datetimeFigureOut">
               <a:rPr lang="en-CH" smtClean="0"/>
-              <a:t>26.02.2025</a:t>
+              <a:t>28.02.2025</a:t>
             </a:fld>
             <a:endParaRPr lang="en-CH"/>
           </a:p>
@@ -2400,7 +2400,7 @@
           <a:p>
             <a:fld id="{C495F1F3-8899-4B4B-9F01-FEC3C350F1B8}" type="datetimeFigureOut">
               <a:rPr lang="en-CH" smtClean="0"/>
-              <a:t>26.02.2025</a:t>
+              <a:t>28.02.2025</a:t>
             </a:fld>
             <a:endParaRPr lang="en-CH"/>
           </a:p>
@@ -2689,7 +2689,7 @@
           <a:p>
             <a:fld id="{C495F1F3-8899-4B4B-9F01-FEC3C350F1B8}" type="datetimeFigureOut">
               <a:rPr lang="en-CH" smtClean="0"/>
-              <a:t>26.02.2025</a:t>
+              <a:t>28.02.2025</a:t>
             </a:fld>
             <a:endParaRPr lang="en-CH"/>
           </a:p>
@@ -2932,7 +2932,7 @@
           <a:p>
             <a:fld id="{C495F1F3-8899-4B4B-9F01-FEC3C350F1B8}" type="datetimeFigureOut">
               <a:rPr lang="en-CH" smtClean="0"/>
-              <a:t>26.02.2025</a:t>
+              <a:t>28.02.2025</a:t>
             </a:fld>
             <a:endParaRPr lang="en-CH"/>
           </a:p>
@@ -3411,7 +3411,7 @@
           <a:p>
             <a:r>
               <a:rPr lang="en-US" sz="4000" dirty="0"/>
-              <a:t>Author: Sasha Toscano</a:t>
+              <a:t>Sasha Toscano</a:t>
             </a:r>
           </a:p>
           <a:p>
@@ -3639,7 +3639,7 @@
             </a:r>
             <a:r>
               <a:rPr lang="en-US" dirty="0"/>
-              <a:t> glitch”, study of the consequences (analysis of decompiled code)</a:t>
+              <a:t> glitch”, Study of the consequences (analysis of decompiled code)</a:t>
             </a:r>
           </a:p>
           <a:p>
@@ -3663,7 +3663,15 @@
             </a:pPr>
             <a:r>
               <a:rPr lang="en-US" dirty="0"/>
-              <a:t>Recent scenarios analysis, current “State of the art” protection against ACE </a:t>
+              <a:t>Recent scenarios analysis</a:t>
+            </a:r>
+            <a:r>
+              <a:rPr lang="en-US"/>
+              <a:t>, Current </a:t>
+            </a:r>
+            <a:r>
+              <a:rPr lang="en-US" dirty="0"/>
+              <a:t>“State of the art” protection against ACE </a:t>
             </a:r>
             <a:endParaRPr lang="en-CH" dirty="0"/>
           </a:p>

</xml_diff>